<commit_message>
Updated presentation slides script
</commit_message>
<xml_diff>
--- a/img/todolistApp_slides.pptx
+++ b/img/todolistApp_slides.pptx
@@ -3702,7 +3702,7 @@
           <a:p>
             <a:fld id="{B4A751E8-9267-481F-9ED0-3D6415FC7452}" type="datetimeFigureOut">
               <a:rPr lang="en-GB" smtClean="0"/>
-              <a:t>07/02/2022</a:t>
+              <a:t>08/02/2022</a:t>
             </a:fld>
             <a:endParaRPr lang="en-GB"/>
           </a:p>
@@ -4021,7 +4021,7 @@
           <a:p>
             <a:r>
               <a:rPr lang="en-GB" dirty="0"/>
-              <a:t>Welcome. We are a team consisting of three members: Victoria, David and myself. </a:t>
+              <a:t>Welcome Team Awesome. Our Team has three members: Victoria, David and myself. </a:t>
             </a:r>
             <a:br>
               <a:rPr lang="en-GB" dirty="0"/>
@@ -5136,7 +5136,7 @@
           <a:p>
             <a:r>
               <a:rPr lang="en-GB" dirty="0"/>
-              <a:t>I will go through first two items : Design Analysis and Agile Project Methodology + Tech Stack and code.</a:t>
+              <a:t>This is our presentation agenda. I will go through first two items : Design Analysis and Agile Project Methodology + Tech Stack and code.</a:t>
             </a:r>
           </a:p>
         </p:txBody>
@@ -5320,7 +5320,7 @@
           <a:p>
             <a:r>
               <a:rPr lang="en-GB" dirty="0"/>
-              <a:t>For planning, we used Trello and List all the tasks and split among our team members.</a:t>
+              <a:t>For planning, we used Trello and List all the tasks and split the tasks among our team members.</a:t>
             </a:r>
           </a:p>
         </p:txBody>
@@ -5714,7 +5714,7 @@
           <a:p>
             <a:r>
               <a:rPr lang="en-GB" dirty="0"/>
-              <a:t>Now, I will handover to Victoria for Sprint-2 &amp; 3 all mandatory tasks demo.</a:t>
+              <a:t>Now, I will handover to Victoria for Sprint-2 &amp; 3 tasks demo.</a:t>
             </a:r>
           </a:p>
         </p:txBody>
@@ -5986,7 +5986,7 @@
           <a:p>
             <a:fld id="{188BF436-F16F-4603-92E4-D1574BDBC4A4}" type="datetime1">
               <a:rPr lang="en-GB" smtClean="0"/>
-              <a:t>07/02/2022</a:t>
+              <a:t>08/02/2022</a:t>
             </a:fld>
             <a:endParaRPr lang="en-GB"/>
           </a:p>
@@ -6160,7 +6160,7 @@
           <a:p>
             <a:fld id="{86319EE0-2199-4C14-9330-47D01590C563}" type="datetime1">
               <a:rPr lang="en-GB" smtClean="0"/>
-              <a:t>07/02/2022</a:t>
+              <a:t>08/02/2022</a:t>
             </a:fld>
             <a:endParaRPr lang="en-GB"/>
           </a:p>
@@ -6340,7 +6340,7 @@
           <a:p>
             <a:fld id="{8413743D-70CB-4B22-9D8C-6A61F233BA03}" type="datetime1">
               <a:rPr lang="en-GB" smtClean="0"/>
-              <a:t>07/02/2022</a:t>
+              <a:t>08/02/2022</a:t>
             </a:fld>
             <a:endParaRPr lang="en-GB"/>
           </a:p>
@@ -6510,7 +6510,7 @@
           <a:p>
             <a:fld id="{1F5CCAE8-4D96-4549-9B26-67BE77590409}" type="datetime1">
               <a:rPr lang="en-GB" smtClean="0"/>
-              <a:t>07/02/2022</a:t>
+              <a:t>08/02/2022</a:t>
             </a:fld>
             <a:endParaRPr lang="en-GB"/>
           </a:p>
@@ -6758,7 +6758,7 @@
           <a:p>
             <a:fld id="{1E40AF74-DC1E-4A34-AC51-5749F9A40A2B}" type="datetime1">
               <a:rPr lang="en-GB" smtClean="0"/>
-              <a:t>07/02/2022</a:t>
+              <a:t>08/02/2022</a:t>
             </a:fld>
             <a:endParaRPr lang="en-GB"/>
           </a:p>
@@ -6990,7 +6990,7 @@
           <a:p>
             <a:fld id="{F2911F06-1F61-46F0-98FA-985AD34D79D8}" type="datetime1">
               <a:rPr lang="en-GB" smtClean="0"/>
-              <a:t>07/02/2022</a:t>
+              <a:t>08/02/2022</a:t>
             </a:fld>
             <a:endParaRPr lang="en-GB"/>
           </a:p>
@@ -7357,7 +7357,7 @@
           <a:p>
             <a:fld id="{AA12B8BD-A8D3-4D79-B172-2519D907C88E}" type="datetime1">
               <a:rPr lang="en-GB" smtClean="0"/>
-              <a:t>07/02/2022</a:t>
+              <a:t>08/02/2022</a:t>
             </a:fld>
             <a:endParaRPr lang="en-GB"/>
           </a:p>
@@ -7475,7 +7475,7 @@
           <a:p>
             <a:fld id="{A215096B-72B5-4BA6-B096-ED1C8F8A2694}" type="datetime1">
               <a:rPr lang="en-GB" smtClean="0"/>
-              <a:t>07/02/2022</a:t>
+              <a:t>08/02/2022</a:t>
             </a:fld>
             <a:endParaRPr lang="en-GB"/>
           </a:p>
@@ -7570,7 +7570,7 @@
           <a:p>
             <a:fld id="{3756A7BE-7E7F-40AF-98D4-C6405B56EF8B}" type="datetime1">
               <a:rPr lang="en-GB" smtClean="0"/>
-              <a:t>07/02/2022</a:t>
+              <a:t>08/02/2022</a:t>
             </a:fld>
             <a:endParaRPr lang="en-GB"/>
           </a:p>
@@ -7847,7 +7847,7 @@
           <a:p>
             <a:fld id="{7B913207-9966-43BE-BCB0-1713BE162CFC}" type="datetime1">
               <a:rPr lang="en-GB" smtClean="0"/>
-              <a:t>07/02/2022</a:t>
+              <a:t>08/02/2022</a:t>
             </a:fld>
             <a:endParaRPr lang="en-GB"/>
           </a:p>
@@ -8104,7 +8104,7 @@
           <a:p>
             <a:fld id="{4EE2E0B5-35C5-47FC-B7BE-B0307860944C}" type="datetime1">
               <a:rPr lang="en-GB" smtClean="0"/>
-              <a:t>07/02/2022</a:t>
+              <a:t>08/02/2022</a:t>
             </a:fld>
             <a:endParaRPr lang="en-GB"/>
           </a:p>
@@ -8317,7 +8317,7 @@
           <a:p>
             <a:fld id="{F2F2B66B-B3BC-4EAB-BFF1-255436213758}" type="datetime1">
               <a:rPr lang="en-GB" smtClean="0"/>
-              <a:t>07/02/2022</a:t>
+              <a:t>08/02/2022</a:t>
             </a:fld>
             <a:endParaRPr lang="en-GB"/>
           </a:p>
@@ -9169,6 +9169,162 @@
               <a:latin typeface="Arial" panose="020B0604020202020204" pitchFamily="34" charset="0"/>
               <a:cs typeface="Arial" panose="020B0604020202020204" pitchFamily="34" charset="0"/>
             </a:endParaRPr>
+          </a:p>
+        </p:txBody>
+      </p:sp>
+      <p:sp>
+        <p:nvSpPr>
+          <p:cNvPr id="6" name="Rectangle: Rounded Corners 5">
+            <a:extLst>
+              <a:ext uri="{FF2B5EF4-FFF2-40B4-BE49-F238E27FC236}">
+                <a16:creationId xmlns:a16="http://schemas.microsoft.com/office/drawing/2014/main" id="{E55808A9-816C-4D03-9F90-8854025759DB}"/>
+              </a:ext>
+            </a:extLst>
+          </p:cNvPr>
+          <p:cNvSpPr/>
+          <p:nvPr/>
+        </p:nvSpPr>
+        <p:spPr>
+          <a:xfrm>
+            <a:off x="156394" y="182227"/>
+            <a:ext cx="3178477" cy="212220"/>
+          </a:xfrm>
+          <a:prstGeom prst="roundRect">
+            <a:avLst/>
+          </a:prstGeom>
+          <a:noFill/>
+          <a:ln w="38100">
+            <a:solidFill>
+              <a:srgbClr val="92D050"/>
+            </a:solidFill>
+          </a:ln>
+        </p:spPr>
+        <p:style>
+          <a:lnRef idx="2">
+            <a:schemeClr val="accent1">
+              <a:shade val="50000"/>
+            </a:schemeClr>
+          </a:lnRef>
+          <a:fillRef idx="1">
+            <a:schemeClr val="accent1"/>
+          </a:fillRef>
+          <a:effectRef idx="0">
+            <a:schemeClr val="accent1"/>
+          </a:effectRef>
+          <a:fontRef idx="minor">
+            <a:schemeClr val="lt1"/>
+          </a:fontRef>
+        </p:style>
+        <p:txBody>
+          <a:bodyPr rtlCol="0" anchor="ctr"/>
+          <a:lstStyle/>
+          <a:p>
+            <a:pPr algn="ctr"/>
+            <a:endParaRPr lang="en-AU"/>
+          </a:p>
+        </p:txBody>
+      </p:sp>
+      <p:sp>
+        <p:nvSpPr>
+          <p:cNvPr id="8" name="Rectangle: Rounded Corners 7">
+            <a:extLst>
+              <a:ext uri="{FF2B5EF4-FFF2-40B4-BE49-F238E27FC236}">
+                <a16:creationId xmlns:a16="http://schemas.microsoft.com/office/drawing/2014/main" id="{DF6DFBFD-36C0-452D-AB68-4286CCA0CF0B}"/>
+              </a:ext>
+            </a:extLst>
+          </p:cNvPr>
+          <p:cNvSpPr/>
+          <p:nvPr/>
+        </p:nvSpPr>
+        <p:spPr>
+          <a:xfrm>
+            <a:off x="156394" y="574629"/>
+            <a:ext cx="4245277" cy="886617"/>
+          </a:xfrm>
+          <a:prstGeom prst="roundRect">
+            <a:avLst/>
+          </a:prstGeom>
+          <a:noFill/>
+          <a:ln w="38100">
+            <a:solidFill>
+              <a:srgbClr val="92D050"/>
+            </a:solidFill>
+          </a:ln>
+        </p:spPr>
+        <p:style>
+          <a:lnRef idx="2">
+            <a:schemeClr val="accent1">
+              <a:shade val="50000"/>
+            </a:schemeClr>
+          </a:lnRef>
+          <a:fillRef idx="1">
+            <a:schemeClr val="accent1"/>
+          </a:fillRef>
+          <a:effectRef idx="0">
+            <a:schemeClr val="accent1"/>
+          </a:effectRef>
+          <a:fontRef idx="minor">
+            <a:schemeClr val="lt1"/>
+          </a:fontRef>
+        </p:style>
+        <p:txBody>
+          <a:bodyPr rtlCol="0" anchor="ctr"/>
+          <a:lstStyle/>
+          <a:p>
+            <a:pPr algn="ctr"/>
+            <a:endParaRPr lang="en-AU"/>
+          </a:p>
+        </p:txBody>
+      </p:sp>
+      <p:sp>
+        <p:nvSpPr>
+          <p:cNvPr id="9" name="Rectangle: Rounded Corners 8">
+            <a:extLst>
+              <a:ext uri="{FF2B5EF4-FFF2-40B4-BE49-F238E27FC236}">
+                <a16:creationId xmlns:a16="http://schemas.microsoft.com/office/drawing/2014/main" id="{8FF434D0-6264-4090-85C8-B5B5BA0AF31E}"/>
+              </a:ext>
+            </a:extLst>
+          </p:cNvPr>
+          <p:cNvSpPr/>
+          <p:nvPr/>
+        </p:nvSpPr>
+        <p:spPr>
+          <a:xfrm>
+            <a:off x="389476" y="4262778"/>
+            <a:ext cx="4245277" cy="219575"/>
+          </a:xfrm>
+          <a:prstGeom prst="roundRect">
+            <a:avLst/>
+          </a:prstGeom>
+          <a:noFill/>
+          <a:ln w="38100">
+            <a:solidFill>
+              <a:srgbClr val="92D050"/>
+            </a:solidFill>
+          </a:ln>
+        </p:spPr>
+        <p:style>
+          <a:lnRef idx="2">
+            <a:schemeClr val="accent1">
+              <a:shade val="50000"/>
+            </a:schemeClr>
+          </a:lnRef>
+          <a:fillRef idx="1">
+            <a:schemeClr val="accent1"/>
+          </a:fillRef>
+          <a:effectRef idx="0">
+            <a:schemeClr val="accent1"/>
+          </a:effectRef>
+          <a:fontRef idx="minor">
+            <a:schemeClr val="lt1"/>
+          </a:fontRef>
+        </p:style>
+        <p:txBody>
+          <a:bodyPr rtlCol="0" anchor="ctr"/>
+          <a:lstStyle/>
+          <a:p>
+            <a:pPr algn="ctr"/>
+            <a:endParaRPr lang="en-AU"/>
           </a:p>
         </p:txBody>
       </p:sp>
@@ -18959,9 +19115,12 @@
 </file>
 
 <file path=customXml/item1.xml><?xml version="1.0" encoding="utf-8"?>
-<p:properties xmlns:p="http://schemas.microsoft.com/office/2006/metadata/properties" xmlns:xsi="http://www.w3.org/2001/XMLSchema-instance" xmlns:pc="http://schemas.microsoft.com/office/infopath/2007/PartnerControls">
-  <documentManagement/>
-</p:properties>
+<?mso-contentType ?>
+<FormTemplates xmlns="http://schemas.microsoft.com/sharepoint/v3/contenttype/forms">
+  <Display>DocumentLibraryForm</Display>
+  <Edit>DocumentLibraryForm</Edit>
+  <New>DocumentLibraryForm</New>
+</FormTemplates>
 </file>
 
 <file path=customXml/item2.xml><?xml version="1.0" encoding="utf-8"?>
@@ -19136,27 +19295,15 @@
 </file>
 
 <file path=customXml/item3.xml><?xml version="1.0" encoding="utf-8"?>
-<?mso-contentType ?>
-<FormTemplates xmlns="http://schemas.microsoft.com/sharepoint/v3/contenttype/forms">
-  <Display>DocumentLibraryForm</Display>
-  <Edit>DocumentLibraryForm</Edit>
-  <New>DocumentLibraryForm</New>
-</FormTemplates>
+<p:properties xmlns:p="http://schemas.microsoft.com/office/2006/metadata/properties" xmlns:xsi="http://www.w3.org/2001/XMLSchema-instance" xmlns:pc="http://schemas.microsoft.com/office/infopath/2007/PartnerControls">
+  <documentManagement/>
+</p:properties>
 </file>
 
 <file path=customXml/itemProps1.xml><?xml version="1.0" encoding="utf-8"?>
-<ds:datastoreItem xmlns:ds="http://schemas.openxmlformats.org/officeDocument/2006/customXml" ds:itemID="{E10A9764-A70A-46B7-B3FF-ACE451D0597B}">
+<ds:datastoreItem xmlns:ds="http://schemas.openxmlformats.org/officeDocument/2006/customXml" ds:itemID="{1E63731D-55D6-48C7-A93E-889FBDFA8C63}">
   <ds:schemaRefs>
-    <ds:schemaRef ds:uri="02c51461-bf24-400b-b0ac-4a58d6cbdd35"/>
-    <ds:schemaRef ds:uri="http://schemas.microsoft.com/office/2006/documentManagement/types"/>
-    <ds:schemaRef ds:uri="http://purl.org/dc/terms/"/>
-    <ds:schemaRef ds:uri="http://schemas.openxmlformats.org/package/2006/metadata/core-properties"/>
-    <ds:schemaRef ds:uri="http://purl.org/dc/dcmitype/"/>
-    <ds:schemaRef ds:uri="http://schemas.microsoft.com/office/infopath/2007/PartnerControls"/>
-    <ds:schemaRef ds:uri="6e06774a-f37f-46e7-9e87-31458e10f84f"/>
-    <ds:schemaRef ds:uri="http://purl.org/dc/elements/1.1/"/>
-    <ds:schemaRef ds:uri="http://schemas.microsoft.com/office/2006/metadata/properties"/>
-    <ds:schemaRef ds:uri="http://www.w3.org/XML/1998/namespace"/>
+    <ds:schemaRef ds:uri="http://schemas.microsoft.com/sharepoint/v3/contenttype/forms"/>
   </ds:schemaRefs>
 </ds:datastoreItem>
 </file>
@@ -19181,9 +19328,18 @@
 </file>
 
 <file path=customXml/itemProps3.xml><?xml version="1.0" encoding="utf-8"?>
-<ds:datastoreItem xmlns:ds="http://schemas.openxmlformats.org/officeDocument/2006/customXml" ds:itemID="{1E63731D-55D6-48C7-A93E-889FBDFA8C63}">
+<ds:datastoreItem xmlns:ds="http://schemas.openxmlformats.org/officeDocument/2006/customXml" ds:itemID="{E10A9764-A70A-46B7-B3FF-ACE451D0597B}">
   <ds:schemaRefs>
-    <ds:schemaRef ds:uri="http://schemas.microsoft.com/sharepoint/v3/contenttype/forms"/>
+    <ds:schemaRef ds:uri="02c51461-bf24-400b-b0ac-4a58d6cbdd35"/>
+    <ds:schemaRef ds:uri="http://schemas.microsoft.com/office/2006/documentManagement/types"/>
+    <ds:schemaRef ds:uri="http://purl.org/dc/terms/"/>
+    <ds:schemaRef ds:uri="http://schemas.openxmlformats.org/package/2006/metadata/core-properties"/>
+    <ds:schemaRef ds:uri="http://purl.org/dc/dcmitype/"/>
+    <ds:schemaRef ds:uri="http://schemas.microsoft.com/office/infopath/2007/PartnerControls"/>
+    <ds:schemaRef ds:uri="6e06774a-f37f-46e7-9e87-31458e10f84f"/>
+    <ds:schemaRef ds:uri="http://purl.org/dc/elements/1.1/"/>
+    <ds:schemaRef ds:uri="http://schemas.microsoft.com/office/2006/metadata/properties"/>
+    <ds:schemaRef ds:uri="http://www.w3.org/XML/1998/namespace"/>
   </ds:schemaRefs>
 </ds:datastoreItem>
 </file>
</xml_diff>